<commit_message>
added clarification to the trainer wds to distinguish between preparation and transform/enrich
</commit_message>
<xml_diff>
--- a/Whiteboard design session/WDS trainer presentation - Azure Synapse Analytics and AI.pptx
+++ b/Whiteboard design session/WDS trainer presentation - Azure Synapse Analytics and AI.pptx
@@ -233,7 +233,7 @@
           <a:p>
             <a:fld id="{52A13B17-C506-4D51-BB37-16B365906619}" type="datetimeFigureOut">
               <a:rPr lang="en-US" smtClean="0"/>
-              <a:t>7/16/2020</a:t>
+              <a:t>7/18/2020</a:t>
             </a:fld>
             <a:endParaRPr lang="en-US" dirty="0"/>
           </a:p>
@@ -1500,16 +1500,14 @@
               <a:buChar char="•"/>
             </a:pPr>
             <a:r>
-              <a:rPr lang="en-US" sz="1200" b="0" kern="1200" dirty="0">
+              <a:rPr lang="en-US" b="0" dirty="0">
                 <a:solidFill>
-                  <a:schemeClr val="tx1"/>
+                  <a:srgbClr val="D4D4D4"/>
                 </a:solidFill>
                 <a:effectLst/>
-                <a:latin typeface="+mn-lt"/>
-                <a:ea typeface="+mn-ea"/>
-                <a:cs typeface="+mn-cs"/>
-              </a:rPr>
-              <a:t>At this stage Mapping Data Flows, which are Pipeline activities just like the Copy Data activity, can be created using the graphical designer to perform some data preparation tasks. </a:t>
+                <a:latin typeface="Consolas" panose="020B0609020204030204" pitchFamily="49" charset="0"/>
+              </a:rPr>
+              <a:t>At the Preparation stage, Mapping Data Flows, which are Synapse Pipeline activities just like the Copy Data activity, can be created using the graphical designer to perform some data preparation tasks. This preparation step is used to ensure the data being stored in a useful format, like parquet. Initial data cleansing to remove duplicates, filter out erroneous data, as well as impute missing values.</a:t>
             </a:r>
           </a:p>
           <a:p>
@@ -7046,7 +7044,7 @@
                   <a:prstClr val="black"/>
                 </a:solidFill>
               </a:rPr>
-              <a:t>7/16/2020 5:38 PM</a:t>
+              <a:t>7/18/2020 5:07 PM</a:t>
             </a:fld>
             <a:endParaRPr lang="en-US" dirty="0">
               <a:solidFill>
@@ -27307,15 +27305,6 @@
 </file>
 
 <file path=customXml/item1.xml><?xml version="1.0" encoding="utf-8"?>
-<p:properties xmlns:p="http://schemas.microsoft.com/office/2006/metadata/properties" xmlns:xsi="http://www.w3.org/2001/XMLSchema-instance" xmlns:pc="http://schemas.microsoft.com/office/infopath/2007/PartnerControls">
-  <documentManagement>
-    <_ip_UnifiedCompliancePolicyUIAction xmlns="http://schemas.microsoft.com/sharepoint/v3" xsi:nil="true"/>
-    <_ip_UnifiedCompliancePolicyProperties xmlns="http://schemas.microsoft.com/sharepoint/v3" xsi:nil="true"/>
-  </documentManagement>
-</p:properties>
-</file>
-
-<file path=customXml/item2.xml><?xml version="1.0" encoding="utf-8"?>
 <ct:contentTypeSchema xmlns:ct="http://schemas.microsoft.com/office/2006/metadata/contentType" xmlns:ma="http://schemas.microsoft.com/office/2006/metadata/properties/metaAttributes" ct:_="" ma:_="" ma:contentTypeName="Document" ma:contentTypeID="0x010100D15DFA3690A15B4081582BBCC6BEAC3E" ma:contentTypeVersion="9" ma:contentTypeDescription="Create a new document." ma:contentTypeScope="" ma:versionID="642da1784587cbe85a7fdbbe4dc36103">
   <xsd:schema xmlns:xsd="http://www.w3.org/2001/XMLSchema" xmlns:xs="http://www.w3.org/2001/XMLSchema" xmlns:p="http://schemas.microsoft.com/office/2006/metadata/properties" xmlns:ns1="http://schemas.microsoft.com/sharepoint/v3" xmlns:ns2="2023ac63-7b75-4916-a9ee-591457758eee" xmlns:ns3="d9c797ad-d7c3-4982-82b7-81352a75e4a5" targetNamespace="http://schemas.microsoft.com/office/2006/metadata/properties" ma:root="true" ma:fieldsID="91198b0246576053cc55dd2c67035a89" ns1:_="" ns2:_="" ns3:_="">
     <xsd:import namespace="http://schemas.microsoft.com/sharepoint/v3"/>
@@ -27517,6 +27506,15 @@
 </ct:contentTypeSchema>
 </file>
 
+<file path=customXml/item2.xml><?xml version="1.0" encoding="utf-8"?>
+<p:properties xmlns:p="http://schemas.microsoft.com/office/2006/metadata/properties" xmlns:xsi="http://www.w3.org/2001/XMLSchema-instance" xmlns:pc="http://schemas.microsoft.com/office/infopath/2007/PartnerControls">
+  <documentManagement>
+    <_ip_UnifiedCompliancePolicyUIAction xmlns="http://schemas.microsoft.com/sharepoint/v3" xsi:nil="true"/>
+    <_ip_UnifiedCompliancePolicyProperties xmlns="http://schemas.microsoft.com/sharepoint/v3" xsi:nil="true"/>
+  </documentManagement>
+</p:properties>
+</file>
+
 <file path=customXml/item3.xml><?xml version="1.0" encoding="utf-8"?>
 <?mso-contentType ?>
 <FormTemplates xmlns="http://schemas.microsoft.com/sharepoint/v3/contenttype/forms">
@@ -27527,24 +27525,6 @@
 </file>
 
 <file path=customXml/itemProps1.xml><?xml version="1.0" encoding="utf-8"?>
-<ds:datastoreItem xmlns:ds="http://schemas.openxmlformats.org/officeDocument/2006/customXml" ds:itemID="{BAF7D529-36AB-45DA-B239-2F912F2D1610}">
-  <ds:schemaRefs>
-    <ds:schemaRef ds:uri="http://schemas.microsoft.com/office/2006/documentManagement/types"/>
-    <ds:schemaRef ds:uri="http://schemas.microsoft.com/office/infopath/2007/PartnerControls"/>
-    <ds:schemaRef ds:uri="2023ac63-7b75-4916-a9ee-591457758eee"/>
-    <ds:schemaRef ds:uri="http://purl.org/dc/elements/1.1/"/>
-    <ds:schemaRef ds:uri="http://schemas.microsoft.com/office/2006/metadata/properties"/>
-    <ds:schemaRef ds:uri="http://schemas.microsoft.com/sharepoint/v3"/>
-    <ds:schemaRef ds:uri="http://purl.org/dc/terms/"/>
-    <ds:schemaRef ds:uri="http://schemas.openxmlformats.org/package/2006/metadata/core-properties"/>
-    <ds:schemaRef ds:uri="d9c797ad-d7c3-4982-82b7-81352a75e4a5"/>
-    <ds:schemaRef ds:uri="http://www.w3.org/XML/1998/namespace"/>
-    <ds:schemaRef ds:uri="http://purl.org/dc/dcmitype/"/>
-  </ds:schemaRefs>
-</ds:datastoreItem>
-</file>
-
-<file path=customXml/itemProps2.xml><?xml version="1.0" encoding="utf-8"?>
 <ds:datastoreItem xmlns:ds="http://schemas.openxmlformats.org/officeDocument/2006/customXml" ds:itemID="{255F5BEB-6AD6-480A-8556-C80C5EBC10F2}">
   <ds:schemaRefs>
     <ds:schemaRef ds:uri="http://schemas.microsoft.com/office/2006/metadata/contentType"/>
@@ -27564,6 +27544,24 @@
 </ds:datastoreItem>
 </file>
 
+<file path=customXml/itemProps2.xml><?xml version="1.0" encoding="utf-8"?>
+<ds:datastoreItem xmlns:ds="http://schemas.openxmlformats.org/officeDocument/2006/customXml" ds:itemID="{BAF7D529-36AB-45DA-B239-2F912F2D1610}">
+  <ds:schemaRefs>
+    <ds:schemaRef ds:uri="http://schemas.microsoft.com/office/2006/documentManagement/types"/>
+    <ds:schemaRef ds:uri="http://schemas.microsoft.com/office/infopath/2007/PartnerControls"/>
+    <ds:schemaRef ds:uri="2023ac63-7b75-4916-a9ee-591457758eee"/>
+    <ds:schemaRef ds:uri="http://purl.org/dc/elements/1.1/"/>
+    <ds:schemaRef ds:uri="http://schemas.microsoft.com/office/2006/metadata/properties"/>
+    <ds:schemaRef ds:uri="http://schemas.microsoft.com/sharepoint/v3"/>
+    <ds:schemaRef ds:uri="http://purl.org/dc/terms/"/>
+    <ds:schemaRef ds:uri="http://schemas.openxmlformats.org/package/2006/metadata/core-properties"/>
+    <ds:schemaRef ds:uri="d9c797ad-d7c3-4982-82b7-81352a75e4a5"/>
+    <ds:schemaRef ds:uri="http://www.w3.org/XML/1998/namespace"/>
+    <ds:schemaRef ds:uri="http://purl.org/dc/dcmitype/"/>
+  </ds:schemaRefs>
+</ds:datastoreItem>
+</file>
+
 <file path=customXml/itemProps3.xml><?xml version="1.0" encoding="utf-8"?>
 <ds:datastoreItem xmlns:ds="http://schemas.openxmlformats.org/officeDocument/2006/customXml" ds:itemID="{F18501AF-04CF-4482-BAE1-607B49DDC378}">
   <ds:schemaRefs>

</xml_diff>